<commit_message>
updated image typo (its' to it's)
</commit_message>
<xml_diff>
--- a/diagrams/cds-hooks-workflow.pptx
+++ b/diagrams/cds-hooks-workflow.pptx
@@ -247,7 +247,7 @@
           <a:p>
             <a:fld id="{E2590A47-9890-184B-93F5-6517BC6BE400}" type="datetimeFigureOut">
               <a:rPr lang="en-US" smtClean="0"/>
-              <a:t>11/17/17</a:t>
+              <a:t>1/28/2018</a:t>
             </a:fld>
             <a:endParaRPr lang="en-US"/>
           </a:p>
@@ -415,7 +415,7 @@
           <a:p>
             <a:fld id="{E2590A47-9890-184B-93F5-6517BC6BE400}" type="datetimeFigureOut">
               <a:rPr lang="en-US" smtClean="0"/>
-              <a:t>11/17/17</a:t>
+              <a:t>1/28/2018</a:t>
             </a:fld>
             <a:endParaRPr lang="en-US"/>
           </a:p>
@@ -593,7 +593,7 @@
           <a:p>
             <a:fld id="{E2590A47-9890-184B-93F5-6517BC6BE400}" type="datetimeFigureOut">
               <a:rPr lang="en-US" smtClean="0"/>
-              <a:t>11/17/17</a:t>
+              <a:t>1/28/2018</a:t>
             </a:fld>
             <a:endParaRPr lang="en-US"/>
           </a:p>
@@ -761,7 +761,7 @@
           <a:p>
             <a:fld id="{E2590A47-9890-184B-93F5-6517BC6BE400}" type="datetimeFigureOut">
               <a:rPr lang="en-US" smtClean="0"/>
-              <a:t>11/17/17</a:t>
+              <a:t>1/28/2018</a:t>
             </a:fld>
             <a:endParaRPr lang="en-US"/>
           </a:p>
@@ -1006,7 +1006,7 @@
           <a:p>
             <a:fld id="{E2590A47-9890-184B-93F5-6517BC6BE400}" type="datetimeFigureOut">
               <a:rPr lang="en-US" smtClean="0"/>
-              <a:t>11/17/17</a:t>
+              <a:t>1/28/2018</a:t>
             </a:fld>
             <a:endParaRPr lang="en-US"/>
           </a:p>
@@ -1235,7 +1235,7 @@
           <a:p>
             <a:fld id="{E2590A47-9890-184B-93F5-6517BC6BE400}" type="datetimeFigureOut">
               <a:rPr lang="en-US" smtClean="0"/>
-              <a:t>11/17/17</a:t>
+              <a:t>1/28/2018</a:t>
             </a:fld>
             <a:endParaRPr lang="en-US"/>
           </a:p>
@@ -1599,7 +1599,7 @@
           <a:p>
             <a:fld id="{E2590A47-9890-184B-93F5-6517BC6BE400}" type="datetimeFigureOut">
               <a:rPr lang="en-US" smtClean="0"/>
-              <a:t>11/17/17</a:t>
+              <a:t>1/28/2018</a:t>
             </a:fld>
             <a:endParaRPr lang="en-US"/>
           </a:p>
@@ -1716,7 +1716,7 @@
           <a:p>
             <a:fld id="{E2590A47-9890-184B-93F5-6517BC6BE400}" type="datetimeFigureOut">
               <a:rPr lang="en-US" smtClean="0"/>
-              <a:t>11/17/17</a:t>
+              <a:t>1/28/2018</a:t>
             </a:fld>
             <a:endParaRPr lang="en-US"/>
           </a:p>
@@ -1811,7 +1811,7 @@
           <a:p>
             <a:fld id="{E2590A47-9890-184B-93F5-6517BC6BE400}" type="datetimeFigureOut">
               <a:rPr lang="en-US" smtClean="0"/>
-              <a:t>11/17/17</a:t>
+              <a:t>1/28/2018</a:t>
             </a:fld>
             <a:endParaRPr lang="en-US"/>
           </a:p>
@@ -2086,7 +2086,7 @@
           <a:p>
             <a:fld id="{E2590A47-9890-184B-93F5-6517BC6BE400}" type="datetimeFigureOut">
               <a:rPr lang="en-US" smtClean="0"/>
-              <a:t>11/17/17</a:t>
+              <a:t>1/28/2018</a:t>
             </a:fld>
             <a:endParaRPr lang="en-US"/>
           </a:p>
@@ -2338,7 +2338,7 @@
           <a:p>
             <a:fld id="{E2590A47-9890-184B-93F5-6517BC6BE400}" type="datetimeFigureOut">
               <a:rPr lang="en-US" smtClean="0"/>
-              <a:t>11/17/17</a:t>
+              <a:t>1/28/2018</a:t>
             </a:fld>
             <a:endParaRPr lang="en-US"/>
           </a:p>
@@ -2549,7 +2549,7 @@
           <a:p>
             <a:fld id="{E2590A47-9890-184B-93F5-6517BC6BE400}" type="datetimeFigureOut">
               <a:rPr lang="en-US" smtClean="0"/>
-              <a:t>11/17/17</a:t>
+              <a:t>1/28/2018</a:t>
             </a:fld>
             <a:endParaRPr lang="en-US"/>
           </a:p>
@@ -3440,11 +3440,15 @@
               <a:t>executes</a:t>
             </a:r>
             <a:br>
+              <a:rPr lang="en-US"/>
+            </a:br>
+            <a:r>
+              <a:rPr lang="en-US"/>
+              <a:t>it’s </a:t>
+            </a:r>
+            <a:r>
               <a:rPr lang="en-US" dirty="0"/>
-            </a:br>
-            <a:r>
-              <a:rPr lang="en-US" dirty="0"/>
-              <a:t>its’ own rules, leveraging FHIR data as needed</a:t>
+              <a:t>own rules, leveraging FHIR data as needed</a:t>
             </a:r>
             <a:endParaRPr lang="en-US" b="1" dirty="0"/>
           </a:p>
@@ -3917,12 +3921,8 @@
           <a:p>
             <a:pPr algn="r"/>
             <a:r>
-              <a:rPr lang="en-US" b="1" dirty="0" smtClean="0"/>
-              <a:t>smart app </a:t>
-            </a:r>
-            <a:r>
               <a:rPr lang="en-US" b="1" dirty="0"/>
-              <a:t>link </a:t>
+              <a:t>smart app link </a:t>
             </a:r>
             <a:r>
               <a:rPr lang="en-US" dirty="0"/>
@@ -4070,7 +4070,7 @@
           <p:cNvPr id="42" name="Right Arrow 12">
             <a:extLst>
               <a:ext uri="{FF2B5EF4-FFF2-40B4-BE49-F238E27FC236}">
-                <a16:creationId xmlns="" xmlns:a16="http://schemas.microsoft.com/office/drawing/2014/main" id="{8048BFDB-4646-4106-8435-B0A03602DA41}"/>
+                <a16:creationId xmlns:a16="http://schemas.microsoft.com/office/drawing/2014/main" id="{8048BFDB-4646-4106-8435-B0A03602DA41}"/>
               </a:ext>
             </a:extLst>
           </p:cNvPr>
@@ -4146,7 +4146,7 @@
           <p:cNvPr id="25" name="Rectangle 24">
             <a:extLst>
               <a:ext uri="{FF2B5EF4-FFF2-40B4-BE49-F238E27FC236}">
-                <a16:creationId xmlns="" xmlns:a16="http://schemas.microsoft.com/office/drawing/2014/main" id="{C86ACA9B-4052-45AC-8AF9-A285C7B9F54B}"/>
+                <a16:creationId xmlns:a16="http://schemas.microsoft.com/office/drawing/2014/main" id="{C86ACA9B-4052-45AC-8AF9-A285C7B9F54B}"/>
               </a:ext>
             </a:extLst>
           </p:cNvPr>
@@ -4281,10 +4281,6 @@
             <a:r>
               <a:rPr lang="en-US" dirty="0"/>
               <a:t>which is</a:t>
-            </a:r>
-            <a:r>
-              <a:rPr lang="en-US" b="1" dirty="0"/>
-              <a:t/>
             </a:r>
             <a:br>
               <a:rPr lang="en-US" b="1" dirty="0"/>
@@ -4471,7 +4467,7 @@
           <a:blip r:embed="rId3">
             <a:extLst>
               <a:ext uri="{96DAC541-7B7A-43D3-8B79-37D633B846F1}">
-                <asvg:svgBlip xmlns="" xmlns:asvg="http://schemas.microsoft.com/office/drawing/2016/SVG/main" r:embed="rId4"/>
+                <asvg:svgBlip xmlns:asvg="http://schemas.microsoft.com/office/drawing/2016/SVG/main" r:embed="rId4"/>
               </a:ext>
             </a:extLst>
           </a:blip>
@@ -4501,7 +4497,7 @@
           <a:blip r:embed="rId5">
             <a:extLst>
               <a:ext uri="{96DAC541-7B7A-43D3-8B79-37D633B846F1}">
-                <asvg:svgBlip xmlns="" xmlns:asvg="http://schemas.microsoft.com/office/drawing/2016/SVG/main" r:embed="rId6"/>
+                <asvg:svgBlip xmlns:asvg="http://schemas.microsoft.com/office/drawing/2016/SVG/main" r:embed="rId6"/>
               </a:ext>
             </a:extLst>
           </a:blip>
@@ -4524,7 +4520,7 @@
           <p:cNvPr id="39" name="Group 38">
             <a:extLst>
               <a:ext uri="{FF2B5EF4-FFF2-40B4-BE49-F238E27FC236}">
-                <a16:creationId xmlns="" xmlns:a16="http://schemas.microsoft.com/office/drawing/2014/main" id="{E2B8DBAA-EBBE-4144-825F-C599FBD03FE2}"/>
+                <a16:creationId xmlns:a16="http://schemas.microsoft.com/office/drawing/2014/main" id="{E2B8DBAA-EBBE-4144-825F-C599FBD03FE2}"/>
               </a:ext>
             </a:extLst>
           </p:cNvPr>
@@ -4544,7 +4540,7 @@
             <p:cNvPr id="41" name="Rounded Rectangle 3">
               <a:extLst>
                 <a:ext uri="{FF2B5EF4-FFF2-40B4-BE49-F238E27FC236}">
-                  <a16:creationId xmlns="" xmlns:a16="http://schemas.microsoft.com/office/drawing/2014/main" id="{EE7E1289-DCB3-4AC3-925D-31E3594685D7}"/>
+                  <a16:creationId xmlns:a16="http://schemas.microsoft.com/office/drawing/2014/main" id="{EE7E1289-DCB3-4AC3-925D-31E3594685D7}"/>
                 </a:ext>
               </a:extLst>
             </p:cNvPr>
@@ -4595,7 +4591,7 @@
             <p:cNvPr id="42" name="Rounded Rectangle 5">
               <a:extLst>
                 <a:ext uri="{FF2B5EF4-FFF2-40B4-BE49-F238E27FC236}">
-                  <a16:creationId xmlns="" xmlns:a16="http://schemas.microsoft.com/office/drawing/2014/main" id="{0B046402-A20D-4F71-A04D-EC8DC70529B7}"/>
+                  <a16:creationId xmlns:a16="http://schemas.microsoft.com/office/drawing/2014/main" id="{0B046402-A20D-4F71-A04D-EC8DC70529B7}"/>
                 </a:ext>
               </a:extLst>
             </p:cNvPr>
@@ -4646,7 +4642,7 @@
             <p:cNvPr id="43" name="Rounded Rectangle 4">
               <a:extLst>
                 <a:ext uri="{FF2B5EF4-FFF2-40B4-BE49-F238E27FC236}">
-                  <a16:creationId xmlns="" xmlns:a16="http://schemas.microsoft.com/office/drawing/2014/main" id="{8F98339F-623C-4195-82FD-6DA10EAF50B2}"/>
+                  <a16:creationId xmlns:a16="http://schemas.microsoft.com/office/drawing/2014/main" id="{8F98339F-623C-4195-82FD-6DA10EAF50B2}"/>
                 </a:ext>
               </a:extLst>
             </p:cNvPr>
@@ -4708,7 +4704,7 @@
           <p:cNvPr id="44" name="Right Arrow 12">
             <a:extLst>
               <a:ext uri="{FF2B5EF4-FFF2-40B4-BE49-F238E27FC236}">
-                <a16:creationId xmlns="" xmlns:a16="http://schemas.microsoft.com/office/drawing/2014/main" id="{1EC0A1E0-35C4-4638-84CD-9FB0A6B2B0BF}"/>
+                <a16:creationId xmlns:a16="http://schemas.microsoft.com/office/drawing/2014/main" id="{1EC0A1E0-35C4-4638-84CD-9FB0A6B2B0BF}"/>
               </a:ext>
             </a:extLst>
           </p:cNvPr>
@@ -4754,7 +4750,7 @@
           <p:cNvPr id="47" name="Oval 46">
             <a:extLst>
               <a:ext uri="{FF2B5EF4-FFF2-40B4-BE49-F238E27FC236}">
-                <a16:creationId xmlns="" xmlns:a16="http://schemas.microsoft.com/office/drawing/2014/main" id="{47AF288C-F2CE-4675-B69D-F60BDEADFB8A}"/>
+                <a16:creationId xmlns:a16="http://schemas.microsoft.com/office/drawing/2014/main" id="{47AF288C-F2CE-4675-B69D-F60BDEADFB8A}"/>
               </a:ext>
             </a:extLst>
           </p:cNvPr>
@@ -4810,7 +4806,7 @@
           <p:cNvPr id="48" name="Can 52">
             <a:extLst>
               <a:ext uri="{FF2B5EF4-FFF2-40B4-BE49-F238E27FC236}">
-                <a16:creationId xmlns="" xmlns:a16="http://schemas.microsoft.com/office/drawing/2014/main" id="{217C5772-9E9F-4B9C-816E-ADE4FCFF0EC2}"/>
+                <a16:creationId xmlns:a16="http://schemas.microsoft.com/office/drawing/2014/main" id="{217C5772-9E9F-4B9C-816E-ADE4FCFF0EC2}"/>
               </a:ext>
             </a:extLst>
           </p:cNvPr>
@@ -4869,7 +4865,7 @@
           <p:cNvPr id="49" name="Right Arrow 53">
             <a:extLst>
               <a:ext uri="{FF2B5EF4-FFF2-40B4-BE49-F238E27FC236}">
-                <a16:creationId xmlns="" xmlns:a16="http://schemas.microsoft.com/office/drawing/2014/main" id="{9679E464-8EDC-41DD-B3EF-F5EB92F4A3F7}"/>
+                <a16:creationId xmlns:a16="http://schemas.microsoft.com/office/drawing/2014/main" id="{9679E464-8EDC-41DD-B3EF-F5EB92F4A3F7}"/>
               </a:ext>
             </a:extLst>
           </p:cNvPr>
@@ -4915,7 +4911,7 @@
           <p:cNvPr id="50" name="Right Arrow 27">
             <a:extLst>
               <a:ext uri="{FF2B5EF4-FFF2-40B4-BE49-F238E27FC236}">
-                <a16:creationId xmlns="" xmlns:a16="http://schemas.microsoft.com/office/drawing/2014/main" id="{F6754241-0D7A-43CE-B11E-9387C4DAAD98}"/>
+                <a16:creationId xmlns:a16="http://schemas.microsoft.com/office/drawing/2014/main" id="{F6754241-0D7A-43CE-B11E-9387C4DAAD98}"/>
               </a:ext>
             </a:extLst>
           </p:cNvPr>
@@ -4961,7 +4957,7 @@
           <p:cNvPr id="51" name="Oval 50">
             <a:extLst>
               <a:ext uri="{FF2B5EF4-FFF2-40B4-BE49-F238E27FC236}">
-                <a16:creationId xmlns="" xmlns:a16="http://schemas.microsoft.com/office/drawing/2014/main" id="{6D0002CB-B77E-4BFB-8FE8-F1BAFAFB44ED}"/>
+                <a16:creationId xmlns:a16="http://schemas.microsoft.com/office/drawing/2014/main" id="{6D0002CB-B77E-4BFB-8FE8-F1BAFAFB44ED}"/>
               </a:ext>
             </a:extLst>
           </p:cNvPr>
@@ -5010,7 +5006,7 @@
           <p:cNvPr id="52" name="TextBox 51">
             <a:extLst>
               <a:ext uri="{FF2B5EF4-FFF2-40B4-BE49-F238E27FC236}">
-                <a16:creationId xmlns="" xmlns:a16="http://schemas.microsoft.com/office/drawing/2014/main" id="{882A2E26-8F1A-4DF9-AF40-65114D60F9BB}"/>
+                <a16:creationId xmlns:a16="http://schemas.microsoft.com/office/drawing/2014/main" id="{882A2E26-8F1A-4DF9-AF40-65114D60F9BB}"/>
               </a:ext>
             </a:extLst>
           </p:cNvPr>
@@ -5057,7 +5053,7 @@
           <p:cNvPr id="55" name="Elbow Connector 26">
             <a:extLst>
               <a:ext uri="{FF2B5EF4-FFF2-40B4-BE49-F238E27FC236}">
-                <a16:creationId xmlns="" xmlns:a16="http://schemas.microsoft.com/office/drawing/2014/main" id="{C3F84A42-4E84-4E2B-B33E-4FEF892C7C9A}"/>
+                <a16:creationId xmlns:a16="http://schemas.microsoft.com/office/drawing/2014/main" id="{C3F84A42-4E84-4E2B-B33E-4FEF892C7C9A}"/>
               </a:ext>
             </a:extLst>
           </p:cNvPr>
@@ -5100,7 +5096,7 @@
           <p:cNvPr id="56" name="Oval 55">
             <a:extLst>
               <a:ext uri="{FF2B5EF4-FFF2-40B4-BE49-F238E27FC236}">
-                <a16:creationId xmlns="" xmlns:a16="http://schemas.microsoft.com/office/drawing/2014/main" id="{068D7E8C-87F8-4790-ADB2-888FBD94A8AB}"/>
+                <a16:creationId xmlns:a16="http://schemas.microsoft.com/office/drawing/2014/main" id="{068D7E8C-87F8-4790-ADB2-888FBD94A8AB}"/>
               </a:ext>
             </a:extLst>
           </p:cNvPr>
@@ -5186,7 +5182,7 @@
           <p:cNvPr id="20" name="Rectangle 19">
             <a:extLst>
               <a:ext uri="{FF2B5EF4-FFF2-40B4-BE49-F238E27FC236}">
-                <a16:creationId xmlns="" xmlns:a16="http://schemas.microsoft.com/office/drawing/2014/main" id="{F7D69411-E127-459C-927B-F809E219351F}"/>
+                <a16:creationId xmlns:a16="http://schemas.microsoft.com/office/drawing/2014/main" id="{F7D69411-E127-459C-927B-F809E219351F}"/>
               </a:ext>
             </a:extLst>
           </p:cNvPr>
@@ -5268,33 +5264,29 @@
               <a:t>at </a:t>
             </a:r>
             <a:r>
-              <a:rPr lang="en-US" smtClean="0">
+              <a:rPr lang="en-US">
                 <a:latin typeface="Courier New" panose="02070309020205020404" pitchFamily="49" charset="0"/>
                 <a:cs typeface="Courier New" panose="02070309020205020404" pitchFamily="49" charset="0"/>
               </a:rPr>
               <a:t>/</a:t>
             </a:r>
             <a:r>
-              <a:rPr lang="en-US" dirty="0" err="1" smtClean="0">
+              <a:rPr lang="en-US" dirty="0" err="1">
                 <a:latin typeface="Courier New" panose="02070309020205020404" pitchFamily="49" charset="0"/>
                 <a:cs typeface="Courier New" panose="02070309020205020404" pitchFamily="49" charset="0"/>
               </a:rPr>
               <a:t>cds</a:t>
             </a:r>
             <a:r>
-              <a:rPr lang="en-US" dirty="0" smtClean="0">
+              <a:rPr lang="en-US" dirty="0">
                 <a:latin typeface="Courier New" panose="02070309020205020404" pitchFamily="49" charset="0"/>
                 <a:cs typeface="Courier New" panose="02070309020205020404" pitchFamily="49" charset="0"/>
               </a:rPr>
               <a:t>-services</a:t>
             </a:r>
             <a:r>
-              <a:rPr lang="en-US" dirty="0" smtClean="0"/>
-              <a:t> </a:t>
-            </a:r>
-            <a:r>
               <a:rPr lang="en-US" dirty="0"/>
-              <a:t>for a list of available </a:t>
+              <a:t> for a list of available </a:t>
             </a:r>
             <a:r>
               <a:rPr lang="en-US" b="1" dirty="0"/>
@@ -5381,7 +5373,7 @@
           <a:blip r:embed="rId2">
             <a:extLst>
               <a:ext uri="{96DAC541-7B7A-43D3-8B79-37D633B846F1}">
-                <asvg:svgBlip xmlns="" xmlns:asvg="http://schemas.microsoft.com/office/drawing/2016/SVG/main" r:embed="rId3"/>
+                <asvg:svgBlip xmlns:asvg="http://schemas.microsoft.com/office/drawing/2016/SVG/main" r:embed="rId3"/>
               </a:ext>
             </a:extLst>
           </a:blip>
@@ -5411,7 +5403,7 @@
           <a:blip r:embed="rId4">
             <a:extLst>
               <a:ext uri="{96DAC541-7B7A-43D3-8B79-37D633B846F1}">
-                <asvg:svgBlip xmlns="" xmlns:asvg="http://schemas.microsoft.com/office/drawing/2016/SVG/main" r:embed="rId5"/>
+                <asvg:svgBlip xmlns:asvg="http://schemas.microsoft.com/office/drawing/2016/SVG/main" r:embed="rId5"/>
               </a:ext>
             </a:extLst>
           </a:blip>
@@ -5434,7 +5426,7 @@
           <p:cNvPr id="10" name="Picture 9">
             <a:extLst>
               <a:ext uri="{FF2B5EF4-FFF2-40B4-BE49-F238E27FC236}">
-                <a16:creationId xmlns="" xmlns:a16="http://schemas.microsoft.com/office/drawing/2014/main" id="{EE7BEC3C-D287-4B04-8578-DBEEC77A46C2}"/>
+                <a16:creationId xmlns:a16="http://schemas.microsoft.com/office/drawing/2014/main" id="{EE7BEC3C-D287-4B04-8578-DBEEC77A46C2}"/>
               </a:ext>
             </a:extLst>
           </p:cNvPr>
@@ -5464,7 +5456,7 @@
           <p:cNvPr id="28" name="TextBox 27">
             <a:extLst>
               <a:ext uri="{FF2B5EF4-FFF2-40B4-BE49-F238E27FC236}">
-                <a16:creationId xmlns="" xmlns:a16="http://schemas.microsoft.com/office/drawing/2014/main" id="{32629800-87EA-47F0-B126-5C012FC5183C}"/>
+                <a16:creationId xmlns:a16="http://schemas.microsoft.com/office/drawing/2014/main" id="{32629800-87EA-47F0-B126-5C012FC5183C}"/>
               </a:ext>
             </a:extLst>
           </p:cNvPr>
@@ -5515,7 +5507,7 @@
           <p:cNvPr id="21" name="Group 20">
             <a:extLst>
               <a:ext uri="{FF2B5EF4-FFF2-40B4-BE49-F238E27FC236}">
-                <a16:creationId xmlns="" xmlns:a16="http://schemas.microsoft.com/office/drawing/2014/main" id="{F0BA840F-B0E1-40A3-9C18-9DD8F98A0558}"/>
+                <a16:creationId xmlns:a16="http://schemas.microsoft.com/office/drawing/2014/main" id="{F0BA840F-B0E1-40A3-9C18-9DD8F98A0558}"/>
               </a:ext>
             </a:extLst>
           </p:cNvPr>
@@ -5535,7 +5527,7 @@
             <p:cNvPr id="22" name="Rounded Rectangle 3">
               <a:extLst>
                 <a:ext uri="{FF2B5EF4-FFF2-40B4-BE49-F238E27FC236}">
-                  <a16:creationId xmlns="" xmlns:a16="http://schemas.microsoft.com/office/drawing/2014/main" id="{E8356E9B-48F9-4771-953F-C9D88137DAD6}"/>
+                  <a16:creationId xmlns:a16="http://schemas.microsoft.com/office/drawing/2014/main" id="{E8356E9B-48F9-4771-953F-C9D88137DAD6}"/>
                 </a:ext>
               </a:extLst>
             </p:cNvPr>
@@ -5586,7 +5578,7 @@
             <p:cNvPr id="23" name="Rounded Rectangle 5">
               <a:extLst>
                 <a:ext uri="{FF2B5EF4-FFF2-40B4-BE49-F238E27FC236}">
-                  <a16:creationId xmlns="" xmlns:a16="http://schemas.microsoft.com/office/drawing/2014/main" id="{7838ABB0-3F3D-4AC3-ACE3-104122EA09D5}"/>
+                  <a16:creationId xmlns:a16="http://schemas.microsoft.com/office/drawing/2014/main" id="{7838ABB0-3F3D-4AC3-ACE3-104122EA09D5}"/>
                 </a:ext>
               </a:extLst>
             </p:cNvPr>
@@ -5637,7 +5629,7 @@
             <p:cNvPr id="25" name="Rounded Rectangle 4">
               <a:extLst>
                 <a:ext uri="{FF2B5EF4-FFF2-40B4-BE49-F238E27FC236}">
-                  <a16:creationId xmlns="" xmlns:a16="http://schemas.microsoft.com/office/drawing/2014/main" id="{7338FC9F-2BF4-4C0E-A55D-CC468A3ADEAD}"/>
+                  <a16:creationId xmlns:a16="http://schemas.microsoft.com/office/drawing/2014/main" id="{7338FC9F-2BF4-4C0E-A55D-CC468A3ADEAD}"/>
                 </a:ext>
               </a:extLst>
             </p:cNvPr>
@@ -5699,7 +5691,7 @@
           <p:cNvPr id="26" name="Right Arrow 12">
             <a:extLst>
               <a:ext uri="{FF2B5EF4-FFF2-40B4-BE49-F238E27FC236}">
-                <a16:creationId xmlns="" xmlns:a16="http://schemas.microsoft.com/office/drawing/2014/main" id="{57DC8AAA-64D1-469C-88CD-77E39AECC092}"/>
+                <a16:creationId xmlns:a16="http://schemas.microsoft.com/office/drawing/2014/main" id="{57DC8AAA-64D1-469C-88CD-77E39AECC092}"/>
               </a:ext>
             </a:extLst>
           </p:cNvPr>
@@ -5745,7 +5737,7 @@
           <p:cNvPr id="27" name="Oval 26">
             <a:extLst>
               <a:ext uri="{FF2B5EF4-FFF2-40B4-BE49-F238E27FC236}">
-                <a16:creationId xmlns="" xmlns:a16="http://schemas.microsoft.com/office/drawing/2014/main" id="{49A5B84D-631A-48B6-ACE9-2DE8DACEB336}"/>
+                <a16:creationId xmlns:a16="http://schemas.microsoft.com/office/drawing/2014/main" id="{49A5B84D-631A-48B6-ACE9-2DE8DACEB336}"/>
               </a:ext>
             </a:extLst>
           </p:cNvPr>
@@ -5801,7 +5793,7 @@
           <p:cNvPr id="30" name="Elbow Connector 26">
             <a:extLst>
               <a:ext uri="{FF2B5EF4-FFF2-40B4-BE49-F238E27FC236}">
-                <a16:creationId xmlns="" xmlns:a16="http://schemas.microsoft.com/office/drawing/2014/main" id="{BDAB9166-EC70-42F8-BF56-1B806FB1C1FC}"/>
+                <a16:creationId xmlns:a16="http://schemas.microsoft.com/office/drawing/2014/main" id="{BDAB9166-EC70-42F8-BF56-1B806FB1C1FC}"/>
               </a:ext>
             </a:extLst>
           </p:cNvPr>
@@ -5844,7 +5836,7 @@
           <p:cNvPr id="33" name="Oval 32">
             <a:extLst>
               <a:ext uri="{FF2B5EF4-FFF2-40B4-BE49-F238E27FC236}">
-                <a16:creationId xmlns="" xmlns:a16="http://schemas.microsoft.com/office/drawing/2014/main" id="{BD4E84CF-9D91-4906-8037-CD6AE7D416DA}"/>
+                <a16:creationId xmlns:a16="http://schemas.microsoft.com/office/drawing/2014/main" id="{BD4E84CF-9D91-4906-8037-CD6AE7D416DA}"/>
               </a:ext>
             </a:extLst>
           </p:cNvPr>
@@ -5900,7 +5892,7 @@
           <p:cNvPr id="34" name="Oval 33">
             <a:extLst>
               <a:ext uri="{FF2B5EF4-FFF2-40B4-BE49-F238E27FC236}">
-                <a16:creationId xmlns="" xmlns:a16="http://schemas.microsoft.com/office/drawing/2014/main" id="{1DC8F596-F207-40C7-B2E3-7395D8D2336D}"/>
+                <a16:creationId xmlns:a16="http://schemas.microsoft.com/office/drawing/2014/main" id="{1DC8F596-F207-40C7-B2E3-7395D8D2336D}"/>
               </a:ext>
             </a:extLst>
           </p:cNvPr>
@@ -5949,7 +5941,7 @@
           <p:cNvPr id="35" name="TextBox 34">
             <a:extLst>
               <a:ext uri="{FF2B5EF4-FFF2-40B4-BE49-F238E27FC236}">
-                <a16:creationId xmlns="" xmlns:a16="http://schemas.microsoft.com/office/drawing/2014/main" id="{BC7C89FE-ED23-4135-AA44-C625233C59A5}"/>
+                <a16:creationId xmlns:a16="http://schemas.microsoft.com/office/drawing/2014/main" id="{BC7C89FE-ED23-4135-AA44-C625233C59A5}"/>
               </a:ext>
             </a:extLst>
           </p:cNvPr>

</xml_diff>

<commit_message>
updated image typo (its' to its) (#156)
</commit_message>
<xml_diff>
--- a/diagrams/cds-hooks-workflow.pptx
+++ b/diagrams/cds-hooks-workflow.pptx
@@ -247,7 +247,7 @@
           <a:p>
             <a:fld id="{E2590A47-9890-184B-93F5-6517BC6BE400}" type="datetimeFigureOut">
               <a:rPr lang="en-US" smtClean="0"/>
-              <a:t>11/17/17</a:t>
+              <a:t>1/28/2018</a:t>
             </a:fld>
             <a:endParaRPr lang="en-US"/>
           </a:p>
@@ -415,7 +415,7 @@
           <a:p>
             <a:fld id="{E2590A47-9890-184B-93F5-6517BC6BE400}" type="datetimeFigureOut">
               <a:rPr lang="en-US" smtClean="0"/>
-              <a:t>11/17/17</a:t>
+              <a:t>1/28/2018</a:t>
             </a:fld>
             <a:endParaRPr lang="en-US"/>
           </a:p>
@@ -593,7 +593,7 @@
           <a:p>
             <a:fld id="{E2590A47-9890-184B-93F5-6517BC6BE400}" type="datetimeFigureOut">
               <a:rPr lang="en-US" smtClean="0"/>
-              <a:t>11/17/17</a:t>
+              <a:t>1/28/2018</a:t>
             </a:fld>
             <a:endParaRPr lang="en-US"/>
           </a:p>
@@ -761,7 +761,7 @@
           <a:p>
             <a:fld id="{E2590A47-9890-184B-93F5-6517BC6BE400}" type="datetimeFigureOut">
               <a:rPr lang="en-US" smtClean="0"/>
-              <a:t>11/17/17</a:t>
+              <a:t>1/28/2018</a:t>
             </a:fld>
             <a:endParaRPr lang="en-US"/>
           </a:p>
@@ -1006,7 +1006,7 @@
           <a:p>
             <a:fld id="{E2590A47-9890-184B-93F5-6517BC6BE400}" type="datetimeFigureOut">
               <a:rPr lang="en-US" smtClean="0"/>
-              <a:t>11/17/17</a:t>
+              <a:t>1/28/2018</a:t>
             </a:fld>
             <a:endParaRPr lang="en-US"/>
           </a:p>
@@ -1235,7 +1235,7 @@
           <a:p>
             <a:fld id="{E2590A47-9890-184B-93F5-6517BC6BE400}" type="datetimeFigureOut">
               <a:rPr lang="en-US" smtClean="0"/>
-              <a:t>11/17/17</a:t>
+              <a:t>1/28/2018</a:t>
             </a:fld>
             <a:endParaRPr lang="en-US"/>
           </a:p>
@@ -1599,7 +1599,7 @@
           <a:p>
             <a:fld id="{E2590A47-9890-184B-93F5-6517BC6BE400}" type="datetimeFigureOut">
               <a:rPr lang="en-US" smtClean="0"/>
-              <a:t>11/17/17</a:t>
+              <a:t>1/28/2018</a:t>
             </a:fld>
             <a:endParaRPr lang="en-US"/>
           </a:p>
@@ -1716,7 +1716,7 @@
           <a:p>
             <a:fld id="{E2590A47-9890-184B-93F5-6517BC6BE400}" type="datetimeFigureOut">
               <a:rPr lang="en-US" smtClean="0"/>
-              <a:t>11/17/17</a:t>
+              <a:t>1/28/2018</a:t>
             </a:fld>
             <a:endParaRPr lang="en-US"/>
           </a:p>
@@ -1811,7 +1811,7 @@
           <a:p>
             <a:fld id="{E2590A47-9890-184B-93F5-6517BC6BE400}" type="datetimeFigureOut">
               <a:rPr lang="en-US" smtClean="0"/>
-              <a:t>11/17/17</a:t>
+              <a:t>1/28/2018</a:t>
             </a:fld>
             <a:endParaRPr lang="en-US"/>
           </a:p>
@@ -2086,7 +2086,7 @@
           <a:p>
             <a:fld id="{E2590A47-9890-184B-93F5-6517BC6BE400}" type="datetimeFigureOut">
               <a:rPr lang="en-US" smtClean="0"/>
-              <a:t>11/17/17</a:t>
+              <a:t>1/28/2018</a:t>
             </a:fld>
             <a:endParaRPr lang="en-US"/>
           </a:p>
@@ -2338,7 +2338,7 @@
           <a:p>
             <a:fld id="{E2590A47-9890-184B-93F5-6517BC6BE400}" type="datetimeFigureOut">
               <a:rPr lang="en-US" smtClean="0"/>
-              <a:t>11/17/17</a:t>
+              <a:t>1/28/2018</a:t>
             </a:fld>
             <a:endParaRPr lang="en-US"/>
           </a:p>
@@ -2549,7 +2549,7 @@
           <a:p>
             <a:fld id="{E2590A47-9890-184B-93F5-6517BC6BE400}" type="datetimeFigureOut">
               <a:rPr lang="en-US" smtClean="0"/>
-              <a:t>11/17/17</a:t>
+              <a:t>1/28/2018</a:t>
             </a:fld>
             <a:endParaRPr lang="en-US"/>
           </a:p>
@@ -3440,11 +3440,15 @@
               <a:t>executes</a:t>
             </a:r>
             <a:br>
+              <a:rPr lang="en-US"/>
+            </a:br>
+            <a:r>
+              <a:rPr lang="en-US"/>
+              <a:t>its </a:t>
+            </a:r>
+            <a:r>
               <a:rPr lang="en-US" dirty="0"/>
-            </a:br>
-            <a:r>
-              <a:rPr lang="en-US" dirty="0"/>
-              <a:t>its’ own rules, leveraging FHIR data as needed</a:t>
+              <a:t>own rules, leveraging FHIR data as needed</a:t>
             </a:r>
             <a:endParaRPr lang="en-US" b="1" dirty="0"/>
           </a:p>
@@ -3917,12 +3921,8 @@
           <a:p>
             <a:pPr algn="r"/>
             <a:r>
-              <a:rPr lang="en-US" b="1" dirty="0" smtClean="0"/>
-              <a:t>smart app </a:t>
-            </a:r>
-            <a:r>
               <a:rPr lang="en-US" b="1" dirty="0"/>
-              <a:t>link </a:t>
+              <a:t>smart app link </a:t>
             </a:r>
             <a:r>
               <a:rPr lang="en-US" dirty="0"/>
@@ -4070,7 +4070,7 @@
           <p:cNvPr id="42" name="Right Arrow 12">
             <a:extLst>
               <a:ext uri="{FF2B5EF4-FFF2-40B4-BE49-F238E27FC236}">
-                <a16:creationId xmlns="" xmlns:a16="http://schemas.microsoft.com/office/drawing/2014/main" id="{8048BFDB-4646-4106-8435-B0A03602DA41}"/>
+                <a16:creationId xmlns:a16="http://schemas.microsoft.com/office/drawing/2014/main" id="{8048BFDB-4646-4106-8435-B0A03602DA41}"/>
               </a:ext>
             </a:extLst>
           </p:cNvPr>
@@ -4146,7 +4146,7 @@
           <p:cNvPr id="25" name="Rectangle 24">
             <a:extLst>
               <a:ext uri="{FF2B5EF4-FFF2-40B4-BE49-F238E27FC236}">
-                <a16:creationId xmlns="" xmlns:a16="http://schemas.microsoft.com/office/drawing/2014/main" id="{C86ACA9B-4052-45AC-8AF9-A285C7B9F54B}"/>
+                <a16:creationId xmlns:a16="http://schemas.microsoft.com/office/drawing/2014/main" id="{C86ACA9B-4052-45AC-8AF9-A285C7B9F54B}"/>
               </a:ext>
             </a:extLst>
           </p:cNvPr>
@@ -4281,10 +4281,6 @@
             <a:r>
               <a:rPr lang="en-US" dirty="0"/>
               <a:t>which is</a:t>
-            </a:r>
-            <a:r>
-              <a:rPr lang="en-US" b="1" dirty="0"/>
-              <a:t/>
             </a:r>
             <a:br>
               <a:rPr lang="en-US" b="1" dirty="0"/>
@@ -4471,7 +4467,7 @@
           <a:blip r:embed="rId3">
             <a:extLst>
               <a:ext uri="{96DAC541-7B7A-43D3-8B79-37D633B846F1}">
-                <asvg:svgBlip xmlns="" xmlns:asvg="http://schemas.microsoft.com/office/drawing/2016/SVG/main" r:embed="rId4"/>
+                <asvg:svgBlip xmlns:asvg="http://schemas.microsoft.com/office/drawing/2016/SVG/main" r:embed="rId4"/>
               </a:ext>
             </a:extLst>
           </a:blip>
@@ -4501,7 +4497,7 @@
           <a:blip r:embed="rId5">
             <a:extLst>
               <a:ext uri="{96DAC541-7B7A-43D3-8B79-37D633B846F1}">
-                <asvg:svgBlip xmlns="" xmlns:asvg="http://schemas.microsoft.com/office/drawing/2016/SVG/main" r:embed="rId6"/>
+                <asvg:svgBlip xmlns:asvg="http://schemas.microsoft.com/office/drawing/2016/SVG/main" r:embed="rId6"/>
               </a:ext>
             </a:extLst>
           </a:blip>
@@ -4524,7 +4520,7 @@
           <p:cNvPr id="39" name="Group 38">
             <a:extLst>
               <a:ext uri="{FF2B5EF4-FFF2-40B4-BE49-F238E27FC236}">
-                <a16:creationId xmlns="" xmlns:a16="http://schemas.microsoft.com/office/drawing/2014/main" id="{E2B8DBAA-EBBE-4144-825F-C599FBD03FE2}"/>
+                <a16:creationId xmlns:a16="http://schemas.microsoft.com/office/drawing/2014/main" id="{E2B8DBAA-EBBE-4144-825F-C599FBD03FE2}"/>
               </a:ext>
             </a:extLst>
           </p:cNvPr>
@@ -4544,7 +4540,7 @@
             <p:cNvPr id="41" name="Rounded Rectangle 3">
               <a:extLst>
                 <a:ext uri="{FF2B5EF4-FFF2-40B4-BE49-F238E27FC236}">
-                  <a16:creationId xmlns="" xmlns:a16="http://schemas.microsoft.com/office/drawing/2014/main" id="{EE7E1289-DCB3-4AC3-925D-31E3594685D7}"/>
+                  <a16:creationId xmlns:a16="http://schemas.microsoft.com/office/drawing/2014/main" id="{EE7E1289-DCB3-4AC3-925D-31E3594685D7}"/>
                 </a:ext>
               </a:extLst>
             </p:cNvPr>
@@ -4595,7 +4591,7 @@
             <p:cNvPr id="42" name="Rounded Rectangle 5">
               <a:extLst>
                 <a:ext uri="{FF2B5EF4-FFF2-40B4-BE49-F238E27FC236}">
-                  <a16:creationId xmlns="" xmlns:a16="http://schemas.microsoft.com/office/drawing/2014/main" id="{0B046402-A20D-4F71-A04D-EC8DC70529B7}"/>
+                  <a16:creationId xmlns:a16="http://schemas.microsoft.com/office/drawing/2014/main" id="{0B046402-A20D-4F71-A04D-EC8DC70529B7}"/>
                 </a:ext>
               </a:extLst>
             </p:cNvPr>
@@ -4646,7 +4642,7 @@
             <p:cNvPr id="43" name="Rounded Rectangle 4">
               <a:extLst>
                 <a:ext uri="{FF2B5EF4-FFF2-40B4-BE49-F238E27FC236}">
-                  <a16:creationId xmlns="" xmlns:a16="http://schemas.microsoft.com/office/drawing/2014/main" id="{8F98339F-623C-4195-82FD-6DA10EAF50B2}"/>
+                  <a16:creationId xmlns:a16="http://schemas.microsoft.com/office/drawing/2014/main" id="{8F98339F-623C-4195-82FD-6DA10EAF50B2}"/>
                 </a:ext>
               </a:extLst>
             </p:cNvPr>
@@ -4708,7 +4704,7 @@
           <p:cNvPr id="44" name="Right Arrow 12">
             <a:extLst>
               <a:ext uri="{FF2B5EF4-FFF2-40B4-BE49-F238E27FC236}">
-                <a16:creationId xmlns="" xmlns:a16="http://schemas.microsoft.com/office/drawing/2014/main" id="{1EC0A1E0-35C4-4638-84CD-9FB0A6B2B0BF}"/>
+                <a16:creationId xmlns:a16="http://schemas.microsoft.com/office/drawing/2014/main" id="{1EC0A1E0-35C4-4638-84CD-9FB0A6B2B0BF}"/>
               </a:ext>
             </a:extLst>
           </p:cNvPr>
@@ -4754,7 +4750,7 @@
           <p:cNvPr id="47" name="Oval 46">
             <a:extLst>
               <a:ext uri="{FF2B5EF4-FFF2-40B4-BE49-F238E27FC236}">
-                <a16:creationId xmlns="" xmlns:a16="http://schemas.microsoft.com/office/drawing/2014/main" id="{47AF288C-F2CE-4675-B69D-F60BDEADFB8A}"/>
+                <a16:creationId xmlns:a16="http://schemas.microsoft.com/office/drawing/2014/main" id="{47AF288C-F2CE-4675-B69D-F60BDEADFB8A}"/>
               </a:ext>
             </a:extLst>
           </p:cNvPr>
@@ -4810,7 +4806,7 @@
           <p:cNvPr id="48" name="Can 52">
             <a:extLst>
               <a:ext uri="{FF2B5EF4-FFF2-40B4-BE49-F238E27FC236}">
-                <a16:creationId xmlns="" xmlns:a16="http://schemas.microsoft.com/office/drawing/2014/main" id="{217C5772-9E9F-4B9C-816E-ADE4FCFF0EC2}"/>
+                <a16:creationId xmlns:a16="http://schemas.microsoft.com/office/drawing/2014/main" id="{217C5772-9E9F-4B9C-816E-ADE4FCFF0EC2}"/>
               </a:ext>
             </a:extLst>
           </p:cNvPr>
@@ -4869,7 +4865,7 @@
           <p:cNvPr id="49" name="Right Arrow 53">
             <a:extLst>
               <a:ext uri="{FF2B5EF4-FFF2-40B4-BE49-F238E27FC236}">
-                <a16:creationId xmlns="" xmlns:a16="http://schemas.microsoft.com/office/drawing/2014/main" id="{9679E464-8EDC-41DD-B3EF-F5EB92F4A3F7}"/>
+                <a16:creationId xmlns:a16="http://schemas.microsoft.com/office/drawing/2014/main" id="{9679E464-8EDC-41DD-B3EF-F5EB92F4A3F7}"/>
               </a:ext>
             </a:extLst>
           </p:cNvPr>
@@ -4915,7 +4911,7 @@
           <p:cNvPr id="50" name="Right Arrow 27">
             <a:extLst>
               <a:ext uri="{FF2B5EF4-FFF2-40B4-BE49-F238E27FC236}">
-                <a16:creationId xmlns="" xmlns:a16="http://schemas.microsoft.com/office/drawing/2014/main" id="{F6754241-0D7A-43CE-B11E-9387C4DAAD98}"/>
+                <a16:creationId xmlns:a16="http://schemas.microsoft.com/office/drawing/2014/main" id="{F6754241-0D7A-43CE-B11E-9387C4DAAD98}"/>
               </a:ext>
             </a:extLst>
           </p:cNvPr>
@@ -4961,7 +4957,7 @@
           <p:cNvPr id="51" name="Oval 50">
             <a:extLst>
               <a:ext uri="{FF2B5EF4-FFF2-40B4-BE49-F238E27FC236}">
-                <a16:creationId xmlns="" xmlns:a16="http://schemas.microsoft.com/office/drawing/2014/main" id="{6D0002CB-B77E-4BFB-8FE8-F1BAFAFB44ED}"/>
+                <a16:creationId xmlns:a16="http://schemas.microsoft.com/office/drawing/2014/main" id="{6D0002CB-B77E-4BFB-8FE8-F1BAFAFB44ED}"/>
               </a:ext>
             </a:extLst>
           </p:cNvPr>
@@ -5010,7 +5006,7 @@
           <p:cNvPr id="52" name="TextBox 51">
             <a:extLst>
               <a:ext uri="{FF2B5EF4-FFF2-40B4-BE49-F238E27FC236}">
-                <a16:creationId xmlns="" xmlns:a16="http://schemas.microsoft.com/office/drawing/2014/main" id="{882A2E26-8F1A-4DF9-AF40-65114D60F9BB}"/>
+                <a16:creationId xmlns:a16="http://schemas.microsoft.com/office/drawing/2014/main" id="{882A2E26-8F1A-4DF9-AF40-65114D60F9BB}"/>
               </a:ext>
             </a:extLst>
           </p:cNvPr>
@@ -5057,7 +5053,7 @@
           <p:cNvPr id="55" name="Elbow Connector 26">
             <a:extLst>
               <a:ext uri="{FF2B5EF4-FFF2-40B4-BE49-F238E27FC236}">
-                <a16:creationId xmlns="" xmlns:a16="http://schemas.microsoft.com/office/drawing/2014/main" id="{C3F84A42-4E84-4E2B-B33E-4FEF892C7C9A}"/>
+                <a16:creationId xmlns:a16="http://schemas.microsoft.com/office/drawing/2014/main" id="{C3F84A42-4E84-4E2B-B33E-4FEF892C7C9A}"/>
               </a:ext>
             </a:extLst>
           </p:cNvPr>
@@ -5100,7 +5096,7 @@
           <p:cNvPr id="56" name="Oval 55">
             <a:extLst>
               <a:ext uri="{FF2B5EF4-FFF2-40B4-BE49-F238E27FC236}">
-                <a16:creationId xmlns="" xmlns:a16="http://schemas.microsoft.com/office/drawing/2014/main" id="{068D7E8C-87F8-4790-ADB2-888FBD94A8AB}"/>
+                <a16:creationId xmlns:a16="http://schemas.microsoft.com/office/drawing/2014/main" id="{068D7E8C-87F8-4790-ADB2-888FBD94A8AB}"/>
               </a:ext>
             </a:extLst>
           </p:cNvPr>
@@ -5186,7 +5182,7 @@
           <p:cNvPr id="20" name="Rectangle 19">
             <a:extLst>
               <a:ext uri="{FF2B5EF4-FFF2-40B4-BE49-F238E27FC236}">
-                <a16:creationId xmlns="" xmlns:a16="http://schemas.microsoft.com/office/drawing/2014/main" id="{F7D69411-E127-459C-927B-F809E219351F}"/>
+                <a16:creationId xmlns:a16="http://schemas.microsoft.com/office/drawing/2014/main" id="{F7D69411-E127-459C-927B-F809E219351F}"/>
               </a:ext>
             </a:extLst>
           </p:cNvPr>
@@ -5268,33 +5264,29 @@
               <a:t>at </a:t>
             </a:r>
             <a:r>
-              <a:rPr lang="en-US" smtClean="0">
+              <a:rPr lang="en-US">
                 <a:latin typeface="Courier New" panose="02070309020205020404" pitchFamily="49" charset="0"/>
                 <a:cs typeface="Courier New" panose="02070309020205020404" pitchFamily="49" charset="0"/>
               </a:rPr>
               <a:t>/</a:t>
             </a:r>
             <a:r>
-              <a:rPr lang="en-US" dirty="0" err="1" smtClean="0">
+              <a:rPr lang="en-US" dirty="0" err="1">
                 <a:latin typeface="Courier New" panose="02070309020205020404" pitchFamily="49" charset="0"/>
                 <a:cs typeface="Courier New" panose="02070309020205020404" pitchFamily="49" charset="0"/>
               </a:rPr>
               <a:t>cds</a:t>
             </a:r>
             <a:r>
-              <a:rPr lang="en-US" dirty="0" smtClean="0">
+              <a:rPr lang="en-US" dirty="0">
                 <a:latin typeface="Courier New" panose="02070309020205020404" pitchFamily="49" charset="0"/>
                 <a:cs typeface="Courier New" panose="02070309020205020404" pitchFamily="49" charset="0"/>
               </a:rPr>
               <a:t>-services</a:t>
             </a:r>
             <a:r>
-              <a:rPr lang="en-US" dirty="0" smtClean="0"/>
-              <a:t> </a:t>
-            </a:r>
-            <a:r>
               <a:rPr lang="en-US" dirty="0"/>
-              <a:t>for a list of available </a:t>
+              <a:t> for a list of available </a:t>
             </a:r>
             <a:r>
               <a:rPr lang="en-US" b="1" dirty="0"/>
@@ -5381,7 +5373,7 @@
           <a:blip r:embed="rId2">
             <a:extLst>
               <a:ext uri="{96DAC541-7B7A-43D3-8B79-37D633B846F1}">
-                <asvg:svgBlip xmlns="" xmlns:asvg="http://schemas.microsoft.com/office/drawing/2016/SVG/main" r:embed="rId3"/>
+                <asvg:svgBlip xmlns:asvg="http://schemas.microsoft.com/office/drawing/2016/SVG/main" r:embed="rId3"/>
               </a:ext>
             </a:extLst>
           </a:blip>
@@ -5411,7 +5403,7 @@
           <a:blip r:embed="rId4">
             <a:extLst>
               <a:ext uri="{96DAC541-7B7A-43D3-8B79-37D633B846F1}">
-                <asvg:svgBlip xmlns="" xmlns:asvg="http://schemas.microsoft.com/office/drawing/2016/SVG/main" r:embed="rId5"/>
+                <asvg:svgBlip xmlns:asvg="http://schemas.microsoft.com/office/drawing/2016/SVG/main" r:embed="rId5"/>
               </a:ext>
             </a:extLst>
           </a:blip>
@@ -5434,7 +5426,7 @@
           <p:cNvPr id="10" name="Picture 9">
             <a:extLst>
               <a:ext uri="{FF2B5EF4-FFF2-40B4-BE49-F238E27FC236}">
-                <a16:creationId xmlns="" xmlns:a16="http://schemas.microsoft.com/office/drawing/2014/main" id="{EE7BEC3C-D287-4B04-8578-DBEEC77A46C2}"/>
+                <a16:creationId xmlns:a16="http://schemas.microsoft.com/office/drawing/2014/main" id="{EE7BEC3C-D287-4B04-8578-DBEEC77A46C2}"/>
               </a:ext>
             </a:extLst>
           </p:cNvPr>
@@ -5464,7 +5456,7 @@
           <p:cNvPr id="28" name="TextBox 27">
             <a:extLst>
               <a:ext uri="{FF2B5EF4-FFF2-40B4-BE49-F238E27FC236}">
-                <a16:creationId xmlns="" xmlns:a16="http://schemas.microsoft.com/office/drawing/2014/main" id="{32629800-87EA-47F0-B126-5C012FC5183C}"/>
+                <a16:creationId xmlns:a16="http://schemas.microsoft.com/office/drawing/2014/main" id="{32629800-87EA-47F0-B126-5C012FC5183C}"/>
               </a:ext>
             </a:extLst>
           </p:cNvPr>
@@ -5515,7 +5507,7 @@
           <p:cNvPr id="21" name="Group 20">
             <a:extLst>
               <a:ext uri="{FF2B5EF4-FFF2-40B4-BE49-F238E27FC236}">
-                <a16:creationId xmlns="" xmlns:a16="http://schemas.microsoft.com/office/drawing/2014/main" id="{F0BA840F-B0E1-40A3-9C18-9DD8F98A0558}"/>
+                <a16:creationId xmlns:a16="http://schemas.microsoft.com/office/drawing/2014/main" id="{F0BA840F-B0E1-40A3-9C18-9DD8F98A0558}"/>
               </a:ext>
             </a:extLst>
           </p:cNvPr>
@@ -5535,7 +5527,7 @@
             <p:cNvPr id="22" name="Rounded Rectangle 3">
               <a:extLst>
                 <a:ext uri="{FF2B5EF4-FFF2-40B4-BE49-F238E27FC236}">
-                  <a16:creationId xmlns="" xmlns:a16="http://schemas.microsoft.com/office/drawing/2014/main" id="{E8356E9B-48F9-4771-953F-C9D88137DAD6}"/>
+                  <a16:creationId xmlns:a16="http://schemas.microsoft.com/office/drawing/2014/main" id="{E8356E9B-48F9-4771-953F-C9D88137DAD6}"/>
                 </a:ext>
               </a:extLst>
             </p:cNvPr>
@@ -5586,7 +5578,7 @@
             <p:cNvPr id="23" name="Rounded Rectangle 5">
               <a:extLst>
                 <a:ext uri="{FF2B5EF4-FFF2-40B4-BE49-F238E27FC236}">
-                  <a16:creationId xmlns="" xmlns:a16="http://schemas.microsoft.com/office/drawing/2014/main" id="{7838ABB0-3F3D-4AC3-ACE3-104122EA09D5}"/>
+                  <a16:creationId xmlns:a16="http://schemas.microsoft.com/office/drawing/2014/main" id="{7838ABB0-3F3D-4AC3-ACE3-104122EA09D5}"/>
                 </a:ext>
               </a:extLst>
             </p:cNvPr>
@@ -5637,7 +5629,7 @@
             <p:cNvPr id="25" name="Rounded Rectangle 4">
               <a:extLst>
                 <a:ext uri="{FF2B5EF4-FFF2-40B4-BE49-F238E27FC236}">
-                  <a16:creationId xmlns="" xmlns:a16="http://schemas.microsoft.com/office/drawing/2014/main" id="{7338FC9F-2BF4-4C0E-A55D-CC468A3ADEAD}"/>
+                  <a16:creationId xmlns:a16="http://schemas.microsoft.com/office/drawing/2014/main" id="{7338FC9F-2BF4-4C0E-A55D-CC468A3ADEAD}"/>
                 </a:ext>
               </a:extLst>
             </p:cNvPr>
@@ -5699,7 +5691,7 @@
           <p:cNvPr id="26" name="Right Arrow 12">
             <a:extLst>
               <a:ext uri="{FF2B5EF4-FFF2-40B4-BE49-F238E27FC236}">
-                <a16:creationId xmlns="" xmlns:a16="http://schemas.microsoft.com/office/drawing/2014/main" id="{57DC8AAA-64D1-469C-88CD-77E39AECC092}"/>
+                <a16:creationId xmlns:a16="http://schemas.microsoft.com/office/drawing/2014/main" id="{57DC8AAA-64D1-469C-88CD-77E39AECC092}"/>
               </a:ext>
             </a:extLst>
           </p:cNvPr>
@@ -5745,7 +5737,7 @@
           <p:cNvPr id="27" name="Oval 26">
             <a:extLst>
               <a:ext uri="{FF2B5EF4-FFF2-40B4-BE49-F238E27FC236}">
-                <a16:creationId xmlns="" xmlns:a16="http://schemas.microsoft.com/office/drawing/2014/main" id="{49A5B84D-631A-48B6-ACE9-2DE8DACEB336}"/>
+                <a16:creationId xmlns:a16="http://schemas.microsoft.com/office/drawing/2014/main" id="{49A5B84D-631A-48B6-ACE9-2DE8DACEB336}"/>
               </a:ext>
             </a:extLst>
           </p:cNvPr>
@@ -5801,7 +5793,7 @@
           <p:cNvPr id="30" name="Elbow Connector 26">
             <a:extLst>
               <a:ext uri="{FF2B5EF4-FFF2-40B4-BE49-F238E27FC236}">
-                <a16:creationId xmlns="" xmlns:a16="http://schemas.microsoft.com/office/drawing/2014/main" id="{BDAB9166-EC70-42F8-BF56-1B806FB1C1FC}"/>
+                <a16:creationId xmlns:a16="http://schemas.microsoft.com/office/drawing/2014/main" id="{BDAB9166-EC70-42F8-BF56-1B806FB1C1FC}"/>
               </a:ext>
             </a:extLst>
           </p:cNvPr>
@@ -5844,7 +5836,7 @@
           <p:cNvPr id="33" name="Oval 32">
             <a:extLst>
               <a:ext uri="{FF2B5EF4-FFF2-40B4-BE49-F238E27FC236}">
-                <a16:creationId xmlns="" xmlns:a16="http://schemas.microsoft.com/office/drawing/2014/main" id="{BD4E84CF-9D91-4906-8037-CD6AE7D416DA}"/>
+                <a16:creationId xmlns:a16="http://schemas.microsoft.com/office/drawing/2014/main" id="{BD4E84CF-9D91-4906-8037-CD6AE7D416DA}"/>
               </a:ext>
             </a:extLst>
           </p:cNvPr>
@@ -5900,7 +5892,7 @@
           <p:cNvPr id="34" name="Oval 33">
             <a:extLst>
               <a:ext uri="{FF2B5EF4-FFF2-40B4-BE49-F238E27FC236}">
-                <a16:creationId xmlns="" xmlns:a16="http://schemas.microsoft.com/office/drawing/2014/main" id="{1DC8F596-F207-40C7-B2E3-7395D8D2336D}"/>
+                <a16:creationId xmlns:a16="http://schemas.microsoft.com/office/drawing/2014/main" id="{1DC8F596-F207-40C7-B2E3-7395D8D2336D}"/>
               </a:ext>
             </a:extLst>
           </p:cNvPr>
@@ -5949,7 +5941,7 @@
           <p:cNvPr id="35" name="TextBox 34">
             <a:extLst>
               <a:ext uri="{FF2B5EF4-FFF2-40B4-BE49-F238E27FC236}">
-                <a16:creationId xmlns="" xmlns:a16="http://schemas.microsoft.com/office/drawing/2014/main" id="{BC7C89FE-ED23-4135-AA44-C625233C59A5}"/>
+                <a16:creationId xmlns:a16="http://schemas.microsoft.com/office/drawing/2014/main" id="{BC7C89FE-ED23-4135-AA44-C625233C59A5}"/>
               </a:ext>
             </a:extLst>
           </p:cNvPr>

</xml_diff>